<commit_message>
Add small internet with dns and load balancer
</commit_message>
<xml_diff>
--- a/001-kathara-introduction.pptx
+++ b/001-kathara-introduction.pptx
@@ -34958,7 +34958,7 @@
         <p:spPr bwMode="auto">
           <a:xfrm>
             <a:off x="1775520" y="4293096"/>
-            <a:ext cx="4392613" cy="863600"/>
+            <a:ext cx="4608512" cy="863600"/>
           </a:xfrm>
           <a:prstGeom prst="foldedCorner">
             <a:avLst>
@@ -35094,7 +35094,7 @@
               <a:rPr lang="it-IT" altLang="it-IT" sz="2000" b="1" dirty="0">
                 <a:latin typeface="Courier New" panose="02070309020205020404" pitchFamily="49" charset="0"/>
               </a:rPr>
-              <a:t> eth0 10.0.0.1 up</a:t>
+              <a:t> eth0 10.0.0.1/24 up</a:t>
             </a:r>
           </a:p>
           <a:p>

</xml_diff>